<commit_message>
Update addressbook legacy description
</commit_message>
<xml_diff>
--- a/docs/diagrams/HighLevelSequenceDiagrams.pptx
+++ b/docs/diagrams/HighLevelSequenceDiagrams.pptx
@@ -107,6 +107,22 @@
       </a:defRPr>
     </a:lvl9pPr>
   </p:defaultTextStyle>
+  <p:extLst>
+    <p:ext uri="{EFAFB233-063F-42B5-8137-9DF3F51BA10A}">
+      <p15:sldGuideLst xmlns:p15="http://schemas.microsoft.com/office/powerpoint/2012/main">
+        <p15:guide id="1" orient="horz" pos="1488">
+          <p15:clr>
+            <a:srgbClr val="A4A3A4"/>
+          </p15:clr>
+        </p15:guide>
+        <p15:guide id="2" pos="2880">
+          <p15:clr>
+            <a:srgbClr val="A4A3A4"/>
+          </p15:clr>
+        </p15:guide>
+      </p15:sldGuideLst>
+    </p:ext>
+  </p:extLst>
 </p:presentation>
 </file>
 
@@ -192,7 +208,7 @@
           <a:p>
             <a:fld id="{F5CC4B3F-88C1-4FFA-B1B6-F41C21DC6924}" type="datetimeFigureOut">
               <a:rPr lang="en-US" smtClean="0"/>
-              <a:t>10/16/2016</a:t>
+              <a:t>7/16/2017</a:t>
             </a:fld>
             <a:endParaRPr lang="en-US"/>
           </a:p>
@@ -256,38 +272,37 @@
           <a:p>
             <a:pPr lvl="0"/>
             <a:r>
-              <a:rPr lang="en-US" smtClean="0"/>
+              <a:rPr lang="en-US"/>
               <a:t>Click to edit Master text styles</a:t>
             </a:r>
           </a:p>
           <a:p>
             <a:pPr lvl="1"/>
             <a:r>
-              <a:rPr lang="en-US" smtClean="0"/>
+              <a:rPr lang="en-US"/>
               <a:t>Second level</a:t>
             </a:r>
           </a:p>
           <a:p>
             <a:pPr lvl="2"/>
             <a:r>
-              <a:rPr lang="en-US" smtClean="0"/>
+              <a:rPr lang="en-US"/>
               <a:t>Third level</a:t>
             </a:r>
           </a:p>
           <a:p>
             <a:pPr lvl="3"/>
             <a:r>
-              <a:rPr lang="en-US" smtClean="0"/>
+              <a:rPr lang="en-US"/>
               <a:t>Fourth level</a:t>
             </a:r>
           </a:p>
           <a:p>
             <a:pPr lvl="4"/>
             <a:r>
-              <a:rPr lang="en-US" smtClean="0"/>
+              <a:rPr lang="en-US"/>
               <a:t>Fifth level</a:t>
             </a:r>
-            <a:endParaRPr lang="en-US"/>
           </a:p>
         </p:txBody>
       </p:sp>
@@ -498,10 +513,9 @@
           <a:lstStyle/>
           <a:p>
             <a:r>
-              <a:rPr lang="en-US" smtClean="0"/>
+              <a:rPr lang="en-US"/>
               <a:t>Click to edit Master title style</a:t>
             </a:r>
-            <a:endParaRPr lang="en-US"/>
           </a:p>
         </p:txBody>
       </p:sp>
@@ -617,10 +631,9 @@
           </a:lstStyle>
           <a:p>
             <a:r>
-              <a:rPr lang="en-US" smtClean="0"/>
+              <a:rPr lang="en-US"/>
               <a:t>Click to edit Master subtitle style</a:t>
             </a:r>
-            <a:endParaRPr lang="en-US"/>
           </a:p>
         </p:txBody>
       </p:sp>
@@ -641,7 +654,7 @@
           <a:p>
             <a:fld id="{78C97017-6FC3-485B-9764-EAC9E56C1D49}" type="datetimeFigureOut">
               <a:rPr lang="en-US" smtClean="0"/>
-              <a:t>10/16/2016</a:t>
+              <a:t>7/16/2017</a:t>
             </a:fld>
             <a:endParaRPr lang="en-US"/>
           </a:p>
@@ -735,10 +748,9 @@
           <a:lstStyle/>
           <a:p>
             <a:r>
-              <a:rPr lang="en-US" smtClean="0"/>
+              <a:rPr lang="en-US"/>
               <a:t>Click to edit Master title style</a:t>
             </a:r>
-            <a:endParaRPr lang="en-US"/>
           </a:p>
         </p:txBody>
       </p:sp>
@@ -759,38 +771,37 @@
           <a:p>
             <a:pPr lvl="0"/>
             <a:r>
-              <a:rPr lang="en-US" smtClean="0"/>
+              <a:rPr lang="en-US"/>
               <a:t>Click to edit Master text styles</a:t>
             </a:r>
           </a:p>
           <a:p>
             <a:pPr lvl="1"/>
             <a:r>
-              <a:rPr lang="en-US" smtClean="0"/>
+              <a:rPr lang="en-US"/>
               <a:t>Second level</a:t>
             </a:r>
           </a:p>
           <a:p>
             <a:pPr lvl="2"/>
             <a:r>
-              <a:rPr lang="en-US" smtClean="0"/>
+              <a:rPr lang="en-US"/>
               <a:t>Third level</a:t>
             </a:r>
           </a:p>
           <a:p>
             <a:pPr lvl="3"/>
             <a:r>
-              <a:rPr lang="en-US" smtClean="0"/>
+              <a:rPr lang="en-US"/>
               <a:t>Fourth level</a:t>
             </a:r>
           </a:p>
           <a:p>
             <a:pPr lvl="4"/>
             <a:r>
-              <a:rPr lang="en-US" smtClean="0"/>
+              <a:rPr lang="en-US"/>
               <a:t>Fifth level</a:t>
             </a:r>
-            <a:endParaRPr lang="en-US"/>
           </a:p>
         </p:txBody>
       </p:sp>
@@ -811,7 +822,7 @@
           <a:p>
             <a:fld id="{78C97017-6FC3-485B-9764-EAC9E56C1D49}" type="datetimeFigureOut">
               <a:rPr lang="en-US" smtClean="0"/>
-              <a:t>10/16/2016</a:t>
+              <a:t>7/16/2017</a:t>
             </a:fld>
             <a:endParaRPr lang="en-US"/>
           </a:p>
@@ -910,10 +921,9 @@
           <a:lstStyle/>
           <a:p>
             <a:r>
-              <a:rPr lang="en-US" smtClean="0"/>
+              <a:rPr lang="en-US"/>
               <a:t>Click to edit Master title style</a:t>
             </a:r>
-            <a:endParaRPr lang="en-US"/>
           </a:p>
         </p:txBody>
       </p:sp>
@@ -939,38 +949,37 @@
           <a:p>
             <a:pPr lvl="0"/>
             <a:r>
-              <a:rPr lang="en-US" smtClean="0"/>
+              <a:rPr lang="en-US"/>
               <a:t>Click to edit Master text styles</a:t>
             </a:r>
           </a:p>
           <a:p>
             <a:pPr lvl="1"/>
             <a:r>
-              <a:rPr lang="en-US" smtClean="0"/>
+              <a:rPr lang="en-US"/>
               <a:t>Second level</a:t>
             </a:r>
           </a:p>
           <a:p>
             <a:pPr lvl="2"/>
             <a:r>
-              <a:rPr lang="en-US" smtClean="0"/>
+              <a:rPr lang="en-US"/>
               <a:t>Third level</a:t>
             </a:r>
           </a:p>
           <a:p>
             <a:pPr lvl="3"/>
             <a:r>
-              <a:rPr lang="en-US" smtClean="0"/>
+              <a:rPr lang="en-US"/>
               <a:t>Fourth level</a:t>
             </a:r>
           </a:p>
           <a:p>
             <a:pPr lvl="4"/>
             <a:r>
-              <a:rPr lang="en-US" smtClean="0"/>
+              <a:rPr lang="en-US"/>
               <a:t>Fifth level</a:t>
             </a:r>
-            <a:endParaRPr lang="en-US"/>
           </a:p>
         </p:txBody>
       </p:sp>
@@ -991,7 +1000,7 @@
           <a:p>
             <a:fld id="{78C97017-6FC3-485B-9764-EAC9E56C1D49}" type="datetimeFigureOut">
               <a:rPr lang="en-US" smtClean="0"/>
-              <a:t>10/16/2016</a:t>
+              <a:t>7/16/2017</a:t>
             </a:fld>
             <a:endParaRPr lang="en-US"/>
           </a:p>
@@ -1085,10 +1094,9 @@
           <a:lstStyle/>
           <a:p>
             <a:r>
-              <a:rPr lang="en-US" smtClean="0"/>
+              <a:rPr lang="en-US"/>
               <a:t>Click to edit Master title style</a:t>
             </a:r>
-            <a:endParaRPr lang="en-US"/>
           </a:p>
         </p:txBody>
       </p:sp>
@@ -1109,38 +1117,37 @@
           <a:p>
             <a:pPr lvl="0"/>
             <a:r>
-              <a:rPr lang="en-US" smtClean="0"/>
+              <a:rPr lang="en-US"/>
               <a:t>Click to edit Master text styles</a:t>
             </a:r>
           </a:p>
           <a:p>
             <a:pPr lvl="1"/>
             <a:r>
-              <a:rPr lang="en-US" smtClean="0"/>
+              <a:rPr lang="en-US"/>
               <a:t>Second level</a:t>
             </a:r>
           </a:p>
           <a:p>
             <a:pPr lvl="2"/>
             <a:r>
-              <a:rPr lang="en-US" smtClean="0"/>
+              <a:rPr lang="en-US"/>
               <a:t>Third level</a:t>
             </a:r>
           </a:p>
           <a:p>
             <a:pPr lvl="3"/>
             <a:r>
-              <a:rPr lang="en-US" smtClean="0"/>
+              <a:rPr lang="en-US"/>
               <a:t>Fourth level</a:t>
             </a:r>
           </a:p>
           <a:p>
             <a:pPr lvl="4"/>
             <a:r>
-              <a:rPr lang="en-US" smtClean="0"/>
+              <a:rPr lang="en-US"/>
               <a:t>Fifth level</a:t>
             </a:r>
-            <a:endParaRPr lang="en-US"/>
           </a:p>
         </p:txBody>
       </p:sp>
@@ -1161,7 +1168,7 @@
           <a:p>
             <a:fld id="{78C97017-6FC3-485B-9764-EAC9E56C1D49}" type="datetimeFigureOut">
               <a:rPr lang="en-US" smtClean="0"/>
-              <a:t>10/16/2016</a:t>
+              <a:t>7/16/2017</a:t>
             </a:fld>
             <a:endParaRPr lang="en-US"/>
           </a:p>
@@ -1264,10 +1271,9 @@
           </a:lstStyle>
           <a:p>
             <a:r>
-              <a:rPr lang="en-US" smtClean="0"/>
+              <a:rPr lang="en-US"/>
               <a:t>Click to edit Master title style</a:t>
             </a:r>
-            <a:endParaRPr lang="en-US"/>
           </a:p>
         </p:txBody>
       </p:sp>
@@ -1384,7 +1390,7 @@
           <a:p>
             <a:pPr lvl="0"/>
             <a:r>
-              <a:rPr lang="en-US" smtClean="0"/>
+              <a:rPr lang="en-US"/>
               <a:t>Click to edit Master text styles</a:t>
             </a:r>
           </a:p>
@@ -1407,7 +1413,7 @@
           <a:p>
             <a:fld id="{78C97017-6FC3-485B-9764-EAC9E56C1D49}" type="datetimeFigureOut">
               <a:rPr lang="en-US" smtClean="0"/>
-              <a:t>10/16/2016</a:t>
+              <a:t>7/16/2017</a:t>
             </a:fld>
             <a:endParaRPr lang="en-US"/>
           </a:p>
@@ -1501,10 +1507,9 @@
           <a:lstStyle/>
           <a:p>
             <a:r>
-              <a:rPr lang="en-US" smtClean="0"/>
+              <a:rPr lang="en-US"/>
               <a:t>Click to edit Master title style</a:t>
             </a:r>
-            <a:endParaRPr lang="en-US"/>
           </a:p>
         </p:txBody>
       </p:sp>
@@ -1558,38 +1563,37 @@
           <a:p>
             <a:pPr lvl="0"/>
             <a:r>
-              <a:rPr lang="en-US" smtClean="0"/>
+              <a:rPr lang="en-US"/>
               <a:t>Click to edit Master text styles</a:t>
             </a:r>
           </a:p>
           <a:p>
             <a:pPr lvl="1"/>
             <a:r>
-              <a:rPr lang="en-US" smtClean="0"/>
+              <a:rPr lang="en-US"/>
               <a:t>Second level</a:t>
             </a:r>
           </a:p>
           <a:p>
             <a:pPr lvl="2"/>
             <a:r>
-              <a:rPr lang="en-US" smtClean="0"/>
+              <a:rPr lang="en-US"/>
               <a:t>Third level</a:t>
             </a:r>
           </a:p>
           <a:p>
             <a:pPr lvl="3"/>
             <a:r>
-              <a:rPr lang="en-US" smtClean="0"/>
+              <a:rPr lang="en-US"/>
               <a:t>Fourth level</a:t>
             </a:r>
           </a:p>
           <a:p>
             <a:pPr lvl="4"/>
             <a:r>
-              <a:rPr lang="en-US" smtClean="0"/>
+              <a:rPr lang="en-US"/>
               <a:t>Fifth level</a:t>
             </a:r>
-            <a:endParaRPr lang="en-US"/>
           </a:p>
         </p:txBody>
       </p:sp>
@@ -1643,38 +1647,37 @@
           <a:p>
             <a:pPr lvl="0"/>
             <a:r>
-              <a:rPr lang="en-US" smtClean="0"/>
+              <a:rPr lang="en-US"/>
               <a:t>Click to edit Master text styles</a:t>
             </a:r>
           </a:p>
           <a:p>
             <a:pPr lvl="1"/>
             <a:r>
-              <a:rPr lang="en-US" smtClean="0"/>
+              <a:rPr lang="en-US"/>
               <a:t>Second level</a:t>
             </a:r>
           </a:p>
           <a:p>
             <a:pPr lvl="2"/>
             <a:r>
-              <a:rPr lang="en-US" smtClean="0"/>
+              <a:rPr lang="en-US"/>
               <a:t>Third level</a:t>
             </a:r>
           </a:p>
           <a:p>
             <a:pPr lvl="3"/>
             <a:r>
-              <a:rPr lang="en-US" smtClean="0"/>
+              <a:rPr lang="en-US"/>
               <a:t>Fourth level</a:t>
             </a:r>
           </a:p>
           <a:p>
             <a:pPr lvl="4"/>
             <a:r>
-              <a:rPr lang="en-US" smtClean="0"/>
+              <a:rPr lang="en-US"/>
               <a:t>Fifth level</a:t>
             </a:r>
-            <a:endParaRPr lang="en-US"/>
           </a:p>
         </p:txBody>
       </p:sp>
@@ -1695,7 +1698,7 @@
           <a:p>
             <a:fld id="{78C97017-6FC3-485B-9764-EAC9E56C1D49}" type="datetimeFigureOut">
               <a:rPr lang="en-US" smtClean="0"/>
-              <a:t>10/16/2016</a:t>
+              <a:t>7/16/2017</a:t>
             </a:fld>
             <a:endParaRPr lang="en-US"/>
           </a:p>
@@ -1793,10 +1796,9 @@
           </a:lstStyle>
           <a:p>
             <a:r>
-              <a:rPr lang="en-US" smtClean="0"/>
+              <a:rPr lang="en-US"/>
               <a:t>Click to edit Master title style</a:t>
             </a:r>
-            <a:endParaRPr lang="en-US"/>
           </a:p>
         </p:txBody>
       </p:sp>
@@ -1859,7 +1861,7 @@
           <a:p>
             <a:pPr lvl="0"/>
             <a:r>
-              <a:rPr lang="en-US" smtClean="0"/>
+              <a:rPr lang="en-US"/>
               <a:t>Click to edit Master text styles</a:t>
             </a:r>
           </a:p>
@@ -1915,38 +1917,37 @@
           <a:p>
             <a:pPr lvl="0"/>
             <a:r>
-              <a:rPr lang="en-US" smtClean="0"/>
+              <a:rPr lang="en-US"/>
               <a:t>Click to edit Master text styles</a:t>
             </a:r>
           </a:p>
           <a:p>
             <a:pPr lvl="1"/>
             <a:r>
-              <a:rPr lang="en-US" smtClean="0"/>
+              <a:rPr lang="en-US"/>
               <a:t>Second level</a:t>
             </a:r>
           </a:p>
           <a:p>
             <a:pPr lvl="2"/>
             <a:r>
-              <a:rPr lang="en-US" smtClean="0"/>
+              <a:rPr lang="en-US"/>
               <a:t>Third level</a:t>
             </a:r>
           </a:p>
           <a:p>
             <a:pPr lvl="3"/>
             <a:r>
-              <a:rPr lang="en-US" smtClean="0"/>
+              <a:rPr lang="en-US"/>
               <a:t>Fourth level</a:t>
             </a:r>
           </a:p>
           <a:p>
             <a:pPr lvl="4"/>
             <a:r>
-              <a:rPr lang="en-US" smtClean="0"/>
+              <a:rPr lang="en-US"/>
               <a:t>Fifth level</a:t>
             </a:r>
-            <a:endParaRPr lang="en-US"/>
           </a:p>
         </p:txBody>
       </p:sp>
@@ -2009,7 +2010,7 @@
           <a:p>
             <a:pPr lvl="0"/>
             <a:r>
-              <a:rPr lang="en-US" smtClean="0"/>
+              <a:rPr lang="en-US"/>
               <a:t>Click to edit Master text styles</a:t>
             </a:r>
           </a:p>
@@ -2065,38 +2066,37 @@
           <a:p>
             <a:pPr lvl="0"/>
             <a:r>
-              <a:rPr lang="en-US" smtClean="0"/>
+              <a:rPr lang="en-US"/>
               <a:t>Click to edit Master text styles</a:t>
             </a:r>
           </a:p>
           <a:p>
             <a:pPr lvl="1"/>
             <a:r>
-              <a:rPr lang="en-US" smtClean="0"/>
+              <a:rPr lang="en-US"/>
               <a:t>Second level</a:t>
             </a:r>
           </a:p>
           <a:p>
             <a:pPr lvl="2"/>
             <a:r>
-              <a:rPr lang="en-US" smtClean="0"/>
+              <a:rPr lang="en-US"/>
               <a:t>Third level</a:t>
             </a:r>
           </a:p>
           <a:p>
             <a:pPr lvl="3"/>
             <a:r>
-              <a:rPr lang="en-US" smtClean="0"/>
+              <a:rPr lang="en-US"/>
               <a:t>Fourth level</a:t>
             </a:r>
           </a:p>
           <a:p>
             <a:pPr lvl="4"/>
             <a:r>
-              <a:rPr lang="en-US" smtClean="0"/>
+              <a:rPr lang="en-US"/>
               <a:t>Fifth level</a:t>
             </a:r>
-            <a:endParaRPr lang="en-US"/>
           </a:p>
         </p:txBody>
       </p:sp>
@@ -2117,7 +2117,7 @@
           <a:p>
             <a:fld id="{78C97017-6FC3-485B-9764-EAC9E56C1D49}" type="datetimeFigureOut">
               <a:rPr lang="en-US" smtClean="0"/>
-              <a:t>10/16/2016</a:t>
+              <a:t>7/16/2017</a:t>
             </a:fld>
             <a:endParaRPr lang="en-US"/>
           </a:p>
@@ -2211,10 +2211,9 @@
           <a:lstStyle/>
           <a:p>
             <a:r>
-              <a:rPr lang="en-US" smtClean="0"/>
+              <a:rPr lang="en-US"/>
               <a:t>Click to edit Master title style</a:t>
             </a:r>
-            <a:endParaRPr lang="en-US"/>
           </a:p>
         </p:txBody>
       </p:sp>
@@ -2235,7 +2234,7 @@
           <a:p>
             <a:fld id="{78C97017-6FC3-485B-9764-EAC9E56C1D49}" type="datetimeFigureOut">
               <a:rPr lang="en-US" smtClean="0"/>
-              <a:t>10/16/2016</a:t>
+              <a:t>7/16/2017</a:t>
             </a:fld>
             <a:endParaRPr lang="en-US"/>
           </a:p>
@@ -2330,7 +2329,7 @@
           <a:p>
             <a:fld id="{78C97017-6FC3-485B-9764-EAC9E56C1D49}" type="datetimeFigureOut">
               <a:rPr lang="en-US" smtClean="0"/>
-              <a:t>10/16/2016</a:t>
+              <a:t>7/16/2017</a:t>
             </a:fld>
             <a:endParaRPr lang="en-US"/>
           </a:p>
@@ -2433,10 +2432,9 @@
           </a:lstStyle>
           <a:p>
             <a:r>
-              <a:rPr lang="en-US" smtClean="0"/>
+              <a:rPr lang="en-US"/>
               <a:t>Click to edit Master title style</a:t>
             </a:r>
-            <a:endParaRPr lang="en-US"/>
           </a:p>
         </p:txBody>
       </p:sp>
@@ -2490,38 +2488,37 @@
           <a:p>
             <a:pPr lvl="0"/>
             <a:r>
-              <a:rPr lang="en-US" smtClean="0"/>
+              <a:rPr lang="en-US"/>
               <a:t>Click to edit Master text styles</a:t>
             </a:r>
           </a:p>
           <a:p>
             <a:pPr lvl="1"/>
             <a:r>
-              <a:rPr lang="en-US" smtClean="0"/>
+              <a:rPr lang="en-US"/>
               <a:t>Second level</a:t>
             </a:r>
           </a:p>
           <a:p>
             <a:pPr lvl="2"/>
             <a:r>
-              <a:rPr lang="en-US" smtClean="0"/>
+              <a:rPr lang="en-US"/>
               <a:t>Third level</a:t>
             </a:r>
           </a:p>
           <a:p>
             <a:pPr lvl="3"/>
             <a:r>
-              <a:rPr lang="en-US" smtClean="0"/>
+              <a:rPr lang="en-US"/>
               <a:t>Fourth level</a:t>
             </a:r>
           </a:p>
           <a:p>
             <a:pPr lvl="4"/>
             <a:r>
-              <a:rPr lang="en-US" smtClean="0"/>
+              <a:rPr lang="en-US"/>
               <a:t>Fifth level</a:t>
             </a:r>
-            <a:endParaRPr lang="en-US"/>
           </a:p>
         </p:txBody>
       </p:sp>
@@ -2584,7 +2581,7 @@
           <a:p>
             <a:pPr lvl="0"/>
             <a:r>
-              <a:rPr lang="en-US" smtClean="0"/>
+              <a:rPr lang="en-US"/>
               <a:t>Click to edit Master text styles</a:t>
             </a:r>
           </a:p>
@@ -2607,7 +2604,7 @@
           <a:p>
             <a:fld id="{78C97017-6FC3-485B-9764-EAC9E56C1D49}" type="datetimeFigureOut">
               <a:rPr lang="en-US" smtClean="0"/>
-              <a:t>10/16/2016</a:t>
+              <a:t>7/16/2017</a:t>
             </a:fld>
             <a:endParaRPr lang="en-US"/>
           </a:p>
@@ -2710,10 +2707,9 @@
           </a:lstStyle>
           <a:p>
             <a:r>
-              <a:rPr lang="en-US" smtClean="0"/>
+              <a:rPr lang="en-US"/>
               <a:t>Click to edit Master title style</a:t>
             </a:r>
-            <a:endParaRPr lang="en-US"/>
           </a:p>
         </p:txBody>
       </p:sp>
@@ -2837,7 +2833,7 @@
           <a:p>
             <a:pPr lvl="0"/>
             <a:r>
-              <a:rPr lang="en-US" smtClean="0"/>
+              <a:rPr lang="en-US"/>
               <a:t>Click to edit Master text styles</a:t>
             </a:r>
           </a:p>
@@ -2860,7 +2856,7 @@
           <a:p>
             <a:fld id="{78C97017-6FC3-485B-9764-EAC9E56C1D49}" type="datetimeFigureOut">
               <a:rPr lang="en-US" smtClean="0"/>
-              <a:t>10/16/2016</a:t>
+              <a:t>7/16/2017</a:t>
             </a:fld>
             <a:endParaRPr lang="en-US"/>
           </a:p>
@@ -2969,10 +2965,9 @@
           <a:lstStyle/>
           <a:p>
             <a:r>
-              <a:rPr lang="en-US" smtClean="0"/>
+              <a:rPr lang="en-US"/>
               <a:t>Click to edit Master title style</a:t>
             </a:r>
-            <a:endParaRPr lang="en-US"/>
           </a:p>
         </p:txBody>
       </p:sp>
@@ -3003,38 +2998,37 @@
           <a:p>
             <a:pPr lvl="0"/>
             <a:r>
-              <a:rPr lang="en-US" smtClean="0"/>
+              <a:rPr lang="en-US"/>
               <a:t>Click to edit Master text styles</a:t>
             </a:r>
           </a:p>
           <a:p>
             <a:pPr lvl="1"/>
             <a:r>
-              <a:rPr lang="en-US" smtClean="0"/>
+              <a:rPr lang="en-US"/>
               <a:t>Second level</a:t>
             </a:r>
           </a:p>
           <a:p>
             <a:pPr lvl="2"/>
             <a:r>
-              <a:rPr lang="en-US" smtClean="0"/>
+              <a:rPr lang="en-US"/>
               <a:t>Third level</a:t>
             </a:r>
           </a:p>
           <a:p>
             <a:pPr lvl="3"/>
             <a:r>
-              <a:rPr lang="en-US" smtClean="0"/>
+              <a:rPr lang="en-US"/>
               <a:t>Fourth level</a:t>
             </a:r>
           </a:p>
           <a:p>
             <a:pPr lvl="4"/>
             <a:r>
-              <a:rPr lang="en-US" smtClean="0"/>
+              <a:rPr lang="en-US"/>
               <a:t>Fifth level</a:t>
             </a:r>
-            <a:endParaRPr lang="en-US"/>
           </a:p>
         </p:txBody>
       </p:sp>
@@ -3073,7 +3067,7 @@
           <a:p>
             <a:fld id="{78C97017-6FC3-485B-9764-EAC9E56C1D49}" type="datetimeFigureOut">
               <a:rPr lang="en-US" smtClean="0"/>
-              <a:t>10/16/2016</a:t>
+              <a:t>7/16/2017</a:t>
             </a:fld>
             <a:endParaRPr lang="en-US"/>
           </a:p>
@@ -3492,7 +3486,7 @@
           <a:p>
             <a:pPr algn="ctr"/>
             <a:r>
-              <a:rPr lang="en-US" sz="1600" dirty="0" smtClean="0">
+              <a:rPr lang="en-US" sz="1600" dirty="0">
                 <a:solidFill>
                   <a:schemeClr val="bg1"/>
                 </a:solidFill>
@@ -3856,7 +3850,7 @@
           <a:p>
             <a:pPr algn="ctr"/>
             <a:r>
-              <a:rPr lang="en-US" sz="1600" dirty="0" smtClean="0">
+              <a:rPr lang="en-US" sz="1600" dirty="0">
                 <a:solidFill>
                   <a:schemeClr val="bg1"/>
                 </a:solidFill>
@@ -4003,7 +3997,7 @@
           <a:p>
             <a:pPr algn="ctr"/>
             <a:r>
-              <a:rPr lang="en-US" sz="1600" dirty="0" smtClean="0">
+              <a:rPr lang="en-US" sz="1600" dirty="0">
                 <a:solidFill>
                   <a:schemeClr val="bg1"/>
                 </a:solidFill>
@@ -4165,10 +4159,9 @@
           <a:lstStyle/>
           <a:p>
             <a:r>
-              <a:rPr lang="en-US" sz="1400" dirty="0" smtClean="0"/>
+              <a:rPr lang="en-US" sz="1400" dirty="0"/>
               <a:t>delete 1</a:t>
             </a:r>
-            <a:endParaRPr lang="en-US" sz="1400" dirty="0"/>
           </a:p>
         </p:txBody>
       </p:sp>
@@ -4231,38 +4224,35 @@
           <a:lstStyle/>
           <a:p>
             <a:r>
-              <a:rPr lang="en-US" sz="1400" dirty="0" smtClean="0">
+              <a:rPr lang="en-US" sz="1400" dirty="0">
                 <a:solidFill>
                   <a:srgbClr val="0070C0"/>
                 </a:solidFill>
               </a:rPr>
               <a:t>execute(“delete 1”)</a:t>
             </a:r>
-            <a:endParaRPr lang="en-US" sz="1400" dirty="0">
-              <a:solidFill>
-                <a:srgbClr val="0070C0"/>
-              </a:solidFill>
-            </a:endParaRPr>
           </a:p>
         </p:txBody>
       </p:sp>
       <p:cxnSp>
         <p:nvCxnSpPr>
           <p:cNvPr id="28" name="Straight Arrow Connector 27"/>
-          <p:cNvCxnSpPr/>
+          <p:cNvCxnSpPr>
+            <a:cxnSpLocks/>
+          </p:cNvCxnSpPr>
           <p:nvPr/>
         </p:nvCxnSpPr>
         <p:spPr>
           <a:xfrm>
-            <a:off x="3954408" y="1538409"/>
-            <a:ext cx="1837184" cy="0"/>
+            <a:off x="5933598" y="1650305"/>
+            <a:ext cx="2611196" cy="0"/>
           </a:xfrm>
           <a:prstGeom prst="straightConnector1">
             <a:avLst/>
           </a:prstGeom>
           <a:ln w="19050">
             <a:solidFill>
-              <a:srgbClr val="0070C0"/>
+              <a:srgbClr val="7030A0"/>
             </a:solidFill>
             <a:tailEnd type="arrow"/>
           </a:ln>
@@ -4290,7 +4280,7 @@
         </p:nvSpPr>
         <p:spPr>
           <a:xfrm>
-            <a:off x="4299772" y="1542583"/>
+            <a:off x="4343400" y="1542583"/>
             <a:ext cx="1424846" cy="215444"/>
           </a:xfrm>
           <a:prstGeom prst="rect">
@@ -4305,26 +4295,21 @@
           <a:lstStyle/>
           <a:p>
             <a:r>
-              <a:rPr lang="en-US" sz="1400" dirty="0" err="1" smtClean="0">
+              <a:rPr lang="en-US" sz="1400" dirty="0" err="1">
                 <a:solidFill>
                   <a:srgbClr val="7030A0"/>
                 </a:solidFill>
               </a:rPr>
-              <a:t>deletePerson</a:t>
-            </a:r>
-            <a:r>
-              <a:rPr lang="en-US" sz="1400" dirty="0" smtClean="0">
+              <a:t>deleteTask</a:t>
+            </a:r>
+            <a:r>
+              <a:rPr lang="en-US" sz="1400" dirty="0">
                 <a:solidFill>
                   <a:srgbClr val="7030A0"/>
                 </a:solidFill>
               </a:rPr>
-              <a:t>(p)</a:t>
-            </a:r>
-            <a:endParaRPr lang="en-US" sz="1400" dirty="0">
-              <a:solidFill>
-                <a:srgbClr val="7030A0"/>
-              </a:solidFill>
-            </a:endParaRPr>
+              <a:t>(Task)</a:t>
+            </a:r>
           </a:p>
         </p:txBody>
       </p:sp>
@@ -4336,7 +4321,7 @@
         </p:nvSpPr>
         <p:spPr>
           <a:xfrm>
-            <a:off x="6074030" y="1687656"/>
+            <a:off x="6248400" y="1676400"/>
             <a:ext cx="2438400" cy="215444"/>
           </a:xfrm>
           <a:prstGeom prst="rect">
@@ -4351,7 +4336,7 @@
           <a:lstStyle/>
           <a:p>
             <a:r>
-              <a:rPr lang="en-US" sz="1400" dirty="0" smtClean="0">
+              <a:rPr lang="en-US" sz="1400" dirty="0">
                 <a:solidFill>
                   <a:schemeClr val="accent5">
                     <a:lumMod val="75000"/>
@@ -4361,17 +4346,17 @@
               <a:t>post(</a:t>
             </a:r>
             <a:r>
-              <a:rPr lang="en-US" sz="1400" dirty="0" err="1" smtClean="0">
+              <a:rPr lang="en-US" sz="1400" dirty="0" err="1">
                 <a:solidFill>
                   <a:schemeClr val="accent5">
                     <a:lumMod val="75000"/>
                   </a:schemeClr>
                 </a:solidFill>
               </a:rPr>
-              <a:t>AddressBookChangedEvent</a:t>
-            </a:r>
-            <a:r>
-              <a:rPr lang="en-US" sz="1400" dirty="0" smtClean="0">
+              <a:t>TaskBookChangedEvent</a:t>
+            </a:r>
+            <a:r>
+              <a:rPr lang="en-US" sz="1400" dirty="0">
                 <a:solidFill>
                   <a:schemeClr val="accent5">
                     <a:lumMod val="75000"/>
@@ -4380,13 +4365,6 @@
               </a:rPr>
               <a:t>)</a:t>
             </a:r>
-            <a:endParaRPr lang="en-US" sz="1400" dirty="0">
-              <a:solidFill>
-                <a:schemeClr val="accent5">
-                  <a:lumMod val="75000"/>
-                </a:schemeClr>
-              </a:solidFill>
-            </a:endParaRPr>
           </a:p>
         </p:txBody>
       </p:sp>
@@ -4552,7 +4530,7 @@
           <a:p>
             <a:pPr algn="ctr"/>
             <a:r>
-              <a:rPr lang="en-US" sz="1600" dirty="0" smtClean="0">
+              <a:rPr lang="en-US" sz="1600" dirty="0">
                 <a:solidFill>
                   <a:schemeClr val="bg1"/>
                 </a:solidFill>
@@ -4560,7 +4538,7 @@
               <a:t>:</a:t>
             </a:r>
             <a:r>
-              <a:rPr lang="en-US" sz="1600" dirty="0" err="1" smtClean="0">
+              <a:rPr lang="en-US" sz="1600" dirty="0" err="1">
                 <a:solidFill>
                   <a:schemeClr val="bg1"/>
                 </a:solidFill>
@@ -4622,8 +4600,8 @@
         </p:nvSpPr>
         <p:spPr>
           <a:xfrm>
-            <a:off x="8544794" y="1961202"/>
-            <a:ext cx="142006" cy="176787"/>
+            <a:off x="8544794" y="1668824"/>
+            <a:ext cx="142006" cy="469166"/>
           </a:xfrm>
           <a:prstGeom prst="rect">
             <a:avLst/>
@@ -4672,20 +4650,22 @@
       <p:cxnSp>
         <p:nvCxnSpPr>
           <p:cNvPr id="42" name="Straight Arrow Connector 41"/>
-          <p:cNvCxnSpPr/>
+          <p:cNvCxnSpPr>
+            <a:cxnSpLocks/>
+          </p:cNvCxnSpPr>
           <p:nvPr/>
         </p:nvCxnSpPr>
         <p:spPr>
           <a:xfrm>
-            <a:off x="5943992" y="1961202"/>
-            <a:ext cx="2568438" cy="0"/>
+            <a:off x="3962400" y="1524000"/>
+            <a:ext cx="1829192" cy="0"/>
           </a:xfrm>
           <a:prstGeom prst="straightConnector1">
             <a:avLst/>
           </a:prstGeom>
           <a:ln w="19050">
             <a:solidFill>
-              <a:srgbClr val="7030A0"/>
+              <a:srgbClr val="0070C0"/>
             </a:solidFill>
             <a:tailEnd type="arrow"/>
           </a:ln>
@@ -4708,13 +4688,16 @@
       <p:cxnSp>
         <p:nvCxnSpPr>
           <p:cNvPr id="44" name="Straight Arrow Connector 43"/>
-          <p:cNvCxnSpPr/>
+          <p:cNvCxnSpPr>
+            <a:cxnSpLocks/>
+            <a:endCxn id="41" idx="2"/>
+          </p:cNvCxnSpPr>
           <p:nvPr/>
         </p:nvCxnSpPr>
         <p:spPr>
           <a:xfrm>
             <a:off x="5943992" y="2137989"/>
-            <a:ext cx="2549946" cy="0"/>
+            <a:ext cx="2671805" cy="1"/>
           </a:xfrm>
           <a:prstGeom prst="straightConnector1">
             <a:avLst/>
@@ -4793,7 +4776,7 @@
           <a:p>
             <a:pPr algn="ctr"/>
             <a:r>
-              <a:rPr lang="en-US" sz="1600" dirty="0" smtClean="0">
+              <a:rPr lang="en-US" sz="1600" dirty="0">
                 <a:solidFill>
                   <a:schemeClr val="bg1"/>
                 </a:solidFill>
@@ -4910,7 +4893,7 @@
         </p:nvSpPr>
         <p:spPr>
           <a:xfrm>
-            <a:off x="1810094" y="4797674"/>
+            <a:off x="2133600" y="4797674"/>
             <a:ext cx="2716635" cy="215444"/>
           </a:xfrm>
           <a:prstGeom prst="rect">
@@ -4925,7 +4908,7 @@
           <a:lstStyle/>
           <a:p>
             <a:r>
-              <a:rPr lang="en-US" sz="1400" dirty="0" smtClean="0">
+              <a:rPr lang="en-US" sz="1400" dirty="0">
                 <a:solidFill>
                   <a:schemeClr val="accent5">
                     <a:lumMod val="75000"/>
@@ -4935,17 +4918,17 @@
               <a:t>post(</a:t>
             </a:r>
             <a:r>
-              <a:rPr lang="en-US" sz="1400" dirty="0" err="1" smtClean="0">
+              <a:rPr lang="en-US" sz="1400" dirty="0" err="1">
                 <a:solidFill>
                   <a:schemeClr val="accent5">
                     <a:lumMod val="75000"/>
                   </a:schemeClr>
                 </a:solidFill>
               </a:rPr>
-              <a:t>AddressBookChangedEvent</a:t>
-            </a:r>
-            <a:r>
-              <a:rPr lang="en-US" sz="1400" dirty="0" smtClean="0">
+              <a:t>TaskBookChangedEvent</a:t>
+            </a:r>
+            <a:r>
+              <a:rPr lang="en-US" sz="1400" dirty="0">
                 <a:solidFill>
                   <a:schemeClr val="accent5">
                     <a:lumMod val="75000"/>
@@ -4954,13 +4937,6 @@
               </a:rPr>
               <a:t>)</a:t>
             </a:r>
-            <a:endParaRPr lang="en-US" sz="1400" dirty="0">
-              <a:solidFill>
-                <a:schemeClr val="accent5">
-                  <a:lumMod val="75000"/>
-                </a:schemeClr>
-              </a:solidFill>
-            </a:endParaRPr>
           </a:p>
         </p:txBody>
       </p:sp>
@@ -5052,7 +5028,7 @@
           <a:p>
             <a:pPr algn="ctr"/>
             <a:r>
-              <a:rPr lang="en-US" sz="1600" dirty="0" smtClean="0">
+              <a:rPr lang="en-US" sz="1600" dirty="0">
                 <a:solidFill>
                   <a:schemeClr val="bg1"/>
                 </a:solidFill>
@@ -5060,7 +5036,7 @@
               <a:t>:</a:t>
             </a:r>
             <a:r>
-              <a:rPr lang="en-US" sz="1600" dirty="0" err="1" smtClean="0">
+              <a:rPr lang="en-US" sz="1600" dirty="0" err="1">
                 <a:solidFill>
                   <a:schemeClr val="bg1"/>
                 </a:solidFill>
@@ -5307,17 +5283,17 @@
           <a:lstStyle/>
           <a:p>
             <a:r>
-              <a:rPr lang="en-US" sz="1400" dirty="0" err="1" smtClean="0">
+              <a:rPr lang="en-US" sz="1400" dirty="0" err="1">
                 <a:solidFill>
                   <a:schemeClr val="accent6">
                     <a:lumMod val="75000"/>
                   </a:schemeClr>
                 </a:solidFill>
               </a:rPr>
-              <a:t>handleAddresssBookChangedEvent</a:t>
-            </a:r>
-            <a:r>
-              <a:rPr lang="en-US" sz="1400" dirty="0" smtClean="0">
+              <a:t>handleTaskBookChangedEvent</a:t>
+            </a:r>
+            <a:r>
+              <a:rPr lang="en-US" sz="1400" dirty="0">
                 <a:solidFill>
                   <a:schemeClr val="accent6">
                     <a:lumMod val="75000"/>
@@ -5326,13 +5302,6 @@
               </a:rPr>
               <a:t>()</a:t>
             </a:r>
-            <a:endParaRPr lang="en-US" sz="1400" dirty="0">
-              <a:solidFill>
-                <a:schemeClr val="accent6">
-                  <a:lumMod val="75000"/>
-                </a:schemeClr>
-              </a:solidFill>
-            </a:endParaRPr>
           </a:p>
         </p:txBody>
       </p:sp>
@@ -5417,7 +5386,7 @@
           <a:p>
             <a:pPr algn="ctr"/>
             <a:r>
-              <a:rPr lang="en-US" sz="1600" dirty="0" smtClean="0">
+              <a:rPr lang="en-US" sz="1600" dirty="0">
                 <a:solidFill>
                   <a:schemeClr val="bg1"/>
                 </a:solidFill>
@@ -5605,7 +5574,7 @@
         </p:nvSpPr>
         <p:spPr>
           <a:xfrm>
-            <a:off x="1416276" y="5395369"/>
+            <a:off x="1614456" y="5395800"/>
             <a:ext cx="2659870" cy="215444"/>
           </a:xfrm>
           <a:prstGeom prst="rect">
@@ -5620,26 +5589,21 @@
           <a:lstStyle/>
           <a:p>
             <a:r>
-              <a:rPr lang="en-US" sz="1400" dirty="0" err="1" smtClean="0">
+              <a:rPr lang="en-US" sz="1400" dirty="0" err="1">
                 <a:solidFill>
                   <a:srgbClr val="00B050"/>
                 </a:solidFill>
               </a:rPr>
-              <a:t>handleAddresssBookChangedEvent</a:t>
-            </a:r>
-            <a:r>
-              <a:rPr lang="en-US" sz="1400" dirty="0" smtClean="0">
+              <a:t>handleTaskBookChangedEvent</a:t>
+            </a:r>
+            <a:r>
+              <a:rPr lang="en-US" sz="1400" dirty="0">
                 <a:solidFill>
                   <a:srgbClr val="00B050"/>
                 </a:solidFill>
               </a:rPr>
               <a:t>()</a:t>
             </a:r>
-            <a:endParaRPr lang="en-US" sz="1400" dirty="0">
-              <a:solidFill>
-                <a:srgbClr val="00B050"/>
-              </a:solidFill>
-            </a:endParaRPr>
           </a:p>
         </p:txBody>
       </p:sp>
@@ -5826,18 +5790,13 @@
           <a:p>
             <a:pPr algn="r"/>
             <a:r>
-              <a:rPr lang="en-US" sz="1400" dirty="0" smtClean="0">
+              <a:rPr lang="en-US" sz="1400" dirty="0">
                 <a:solidFill>
                   <a:srgbClr val="00B050"/>
                 </a:solidFill>
               </a:rPr>
               <a:t>Update status bar</a:t>
             </a:r>
-            <a:endParaRPr lang="en-US" sz="1400" dirty="0">
-              <a:solidFill>
-                <a:srgbClr val="00B050"/>
-              </a:solidFill>
-            </a:endParaRPr>
           </a:p>
         </p:txBody>
       </p:sp>
@@ -6027,7 +5986,7 @@
           <a:lstStyle/>
           <a:p>
             <a:r>
-              <a:rPr lang="en-US" sz="1400" dirty="0" smtClean="0">
+              <a:rPr lang="en-US" sz="1400" dirty="0">
                 <a:solidFill>
                   <a:schemeClr val="accent6">
                     <a:lumMod val="75000"/>
@@ -6037,7 +5996,7 @@
               <a:t>Save </a:t>
             </a:r>
             <a:br>
-              <a:rPr lang="en-US" sz="1400" dirty="0" smtClean="0">
+              <a:rPr lang="en-US" sz="1400" dirty="0">
                 <a:solidFill>
                   <a:schemeClr val="accent6">
                     <a:lumMod val="75000"/>
@@ -6046,7 +6005,7 @@
               </a:rPr>
             </a:br>
             <a:r>
-              <a:rPr lang="en-US" sz="1400" dirty="0" smtClean="0">
+              <a:rPr lang="en-US" sz="1400" dirty="0">
                 <a:solidFill>
                   <a:schemeClr val="accent6">
                     <a:lumMod val="75000"/>
@@ -6055,13 +6014,6 @@
               </a:rPr>
               <a:t>to file</a:t>
             </a:r>
-            <a:endParaRPr lang="en-US" sz="1400" dirty="0">
-              <a:solidFill>
-                <a:schemeClr val="accent6">
-                  <a:lumMod val="75000"/>
-                </a:schemeClr>
-              </a:solidFill>
-            </a:endParaRPr>
           </a:p>
         </p:txBody>
       </p:sp>

</xml_diff>

<commit_message>
Rename TaskBook to TaskList
</commit_message>
<xml_diff>
--- a/docs/diagrams/HighLevelSequenceDiagrams.pptx
+++ b/docs/diagrams/HighLevelSequenceDiagrams.pptx
@@ -4321,7 +4321,7 @@
         </p:nvSpPr>
         <p:spPr>
           <a:xfrm>
-            <a:off x="6248400" y="1676400"/>
+            <a:off x="6324600" y="1676400"/>
             <a:ext cx="2438400" cy="215444"/>
           </a:xfrm>
           <a:prstGeom prst="rect">
@@ -4353,7 +4353,7 @@
                   </a:schemeClr>
                 </a:solidFill>
               </a:rPr>
-              <a:t>TaskBookChangedEvent</a:t>
+              <a:t>TaskListChangedEvent</a:t>
             </a:r>
             <a:r>
               <a:rPr lang="en-US" sz="1400" dirty="0">
@@ -4925,7 +4925,7 @@
                   </a:schemeClr>
                 </a:solidFill>
               </a:rPr>
-              <a:t>TaskBookChangedEvent</a:t>
+              <a:t>TaskListChangedEvent</a:t>
             </a:r>
             <a:r>
               <a:rPr lang="en-US" sz="1400" dirty="0">
@@ -5290,7 +5290,7 @@
                   </a:schemeClr>
                 </a:solidFill>
               </a:rPr>
-              <a:t>handleTaskBookChangedEvent</a:t>
+              <a:t>handleTaskListChangedEvent</a:t>
             </a:r>
             <a:r>
               <a:rPr lang="en-US" sz="1400" dirty="0">
@@ -5594,7 +5594,7 @@
                   <a:srgbClr val="00B050"/>
                 </a:solidFill>
               </a:rPr>
-              <a:t>handleTaskBookChangedEvent</a:t>
+              <a:t>handleTaskListChangedEvent</a:t>
             </a:r>
             <a:r>
               <a:rPr lang="en-US" sz="1400" dirty="0">

</xml_diff>